<commit_message>
Added faulty Packet Management
</commit_message>
<xml_diff>
--- a/Documents/Pinup.pptx
+++ b/Documents/Pinup.pptx
@@ -263,7 +263,7 @@
           <a:p>
             <a:fld id="{F2382EA5-9EA5-419F-BAA4-0DC6A82442DC}" type="datetimeFigureOut">
               <a:rPr lang="de-DE" smtClean="0"/>
-              <a:t>30.08.2017</a:t>
+              <a:t>31.08.2017</a:t>
             </a:fld>
             <a:endParaRPr lang="de-DE"/>
           </a:p>
@@ -461,7 +461,7 @@
           <a:p>
             <a:fld id="{F2382EA5-9EA5-419F-BAA4-0DC6A82442DC}" type="datetimeFigureOut">
               <a:rPr lang="de-DE" smtClean="0"/>
-              <a:t>30.08.2017</a:t>
+              <a:t>31.08.2017</a:t>
             </a:fld>
             <a:endParaRPr lang="de-DE"/>
           </a:p>
@@ -669,7 +669,7 @@
           <a:p>
             <a:fld id="{F2382EA5-9EA5-419F-BAA4-0DC6A82442DC}" type="datetimeFigureOut">
               <a:rPr lang="de-DE" smtClean="0"/>
-              <a:t>30.08.2017</a:t>
+              <a:t>31.08.2017</a:t>
             </a:fld>
             <a:endParaRPr lang="de-DE"/>
           </a:p>
@@ -867,7 +867,7 @@
           <a:p>
             <a:fld id="{F2382EA5-9EA5-419F-BAA4-0DC6A82442DC}" type="datetimeFigureOut">
               <a:rPr lang="de-DE" smtClean="0"/>
-              <a:t>30.08.2017</a:t>
+              <a:t>31.08.2017</a:t>
             </a:fld>
             <a:endParaRPr lang="de-DE"/>
           </a:p>
@@ -1142,7 +1142,7 @@
           <a:p>
             <a:fld id="{F2382EA5-9EA5-419F-BAA4-0DC6A82442DC}" type="datetimeFigureOut">
               <a:rPr lang="de-DE" smtClean="0"/>
-              <a:t>30.08.2017</a:t>
+              <a:t>31.08.2017</a:t>
             </a:fld>
             <a:endParaRPr lang="de-DE"/>
           </a:p>
@@ -1407,7 +1407,7 @@
           <a:p>
             <a:fld id="{F2382EA5-9EA5-419F-BAA4-0DC6A82442DC}" type="datetimeFigureOut">
               <a:rPr lang="de-DE" smtClean="0"/>
-              <a:t>30.08.2017</a:t>
+              <a:t>31.08.2017</a:t>
             </a:fld>
             <a:endParaRPr lang="de-DE"/>
           </a:p>
@@ -1819,7 +1819,7 @@
           <a:p>
             <a:fld id="{F2382EA5-9EA5-419F-BAA4-0DC6A82442DC}" type="datetimeFigureOut">
               <a:rPr lang="de-DE" smtClean="0"/>
-              <a:t>30.08.2017</a:t>
+              <a:t>31.08.2017</a:t>
             </a:fld>
             <a:endParaRPr lang="de-DE"/>
           </a:p>
@@ -1960,7 +1960,7 @@
           <a:p>
             <a:fld id="{F2382EA5-9EA5-419F-BAA4-0DC6A82442DC}" type="datetimeFigureOut">
               <a:rPr lang="de-DE" smtClean="0"/>
-              <a:t>30.08.2017</a:t>
+              <a:t>31.08.2017</a:t>
             </a:fld>
             <a:endParaRPr lang="de-DE"/>
           </a:p>
@@ -2073,7 +2073,7 @@
           <a:p>
             <a:fld id="{F2382EA5-9EA5-419F-BAA4-0DC6A82442DC}" type="datetimeFigureOut">
               <a:rPr lang="de-DE" smtClean="0"/>
-              <a:t>30.08.2017</a:t>
+              <a:t>31.08.2017</a:t>
             </a:fld>
             <a:endParaRPr lang="de-DE"/>
           </a:p>
@@ -2384,7 +2384,7 @@
           <a:p>
             <a:fld id="{F2382EA5-9EA5-419F-BAA4-0DC6A82442DC}" type="datetimeFigureOut">
               <a:rPr lang="de-DE" smtClean="0"/>
-              <a:t>30.08.2017</a:t>
+              <a:t>31.08.2017</a:t>
             </a:fld>
             <a:endParaRPr lang="de-DE"/>
           </a:p>
@@ -2672,7 +2672,7 @@
           <a:p>
             <a:fld id="{F2382EA5-9EA5-419F-BAA4-0DC6A82442DC}" type="datetimeFigureOut">
               <a:rPr lang="de-DE" smtClean="0"/>
-              <a:t>30.08.2017</a:t>
+              <a:t>31.08.2017</a:t>
             </a:fld>
             <a:endParaRPr lang="de-DE"/>
           </a:p>
@@ -2913,7 +2913,7 @@
           <a:p>
             <a:fld id="{F2382EA5-9EA5-419F-BAA4-0DC6A82442DC}" type="datetimeFigureOut">
               <a:rPr lang="de-DE" smtClean="0"/>
-              <a:t>30.08.2017</a:t>
+              <a:t>31.08.2017</a:t>
             </a:fld>
             <a:endParaRPr lang="de-DE"/>
           </a:p>
@@ -5896,7 +5896,7 @@
           <p:nvPr>
             <p:extLst>
               <p:ext uri="{D42A27DB-BD31-4B8C-83A1-F6EECF244321}">
-                <p14:modId xmlns:p14="http://schemas.microsoft.com/office/powerpoint/2010/main" val="4178539578"/>
+                <p14:modId xmlns:p14="http://schemas.microsoft.com/office/powerpoint/2010/main" val="2587622977"/>
               </p:ext>
             </p:extLst>
           </p:nvPr>
@@ -5968,7 +5968,7 @@
                       <a:pPr algn="ctr"/>
                       <a:r>
                         <a:rPr lang="de-DE" sz="500" dirty="0"/>
-                        <a:t>Free</a:t>
+                        <a:t>Motor Eis In A</a:t>
                       </a:r>
                     </a:p>
                   </a:txBody>
@@ -6000,7 +6000,7 @@
                       <a:pPr algn="ctr"/>
                       <a:r>
                         <a:rPr lang="de-DE" sz="500" dirty="0"/>
-                        <a:t>Free</a:t>
+                        <a:t>Motor Eis In B</a:t>
                       </a:r>
                     </a:p>
                   </a:txBody>

</xml_diff>

<commit_message>
Added Motor Pins and Control
</commit_message>
<xml_diff>
--- a/Documents/Pinup.pptx
+++ b/Documents/Pinup.pptx
@@ -263,7 +263,7 @@
           <a:p>
             <a:fld id="{F2382EA5-9EA5-419F-BAA4-0DC6A82442DC}" type="datetimeFigureOut">
               <a:rPr lang="de-DE" smtClean="0"/>
-              <a:t>31.08.2017</a:t>
+              <a:t>23.09.2017</a:t>
             </a:fld>
             <a:endParaRPr lang="de-DE"/>
           </a:p>
@@ -461,7 +461,7 @@
           <a:p>
             <a:fld id="{F2382EA5-9EA5-419F-BAA4-0DC6A82442DC}" type="datetimeFigureOut">
               <a:rPr lang="de-DE" smtClean="0"/>
-              <a:t>31.08.2017</a:t>
+              <a:t>23.09.2017</a:t>
             </a:fld>
             <a:endParaRPr lang="de-DE"/>
           </a:p>
@@ -669,7 +669,7 @@
           <a:p>
             <a:fld id="{F2382EA5-9EA5-419F-BAA4-0DC6A82442DC}" type="datetimeFigureOut">
               <a:rPr lang="de-DE" smtClean="0"/>
-              <a:t>31.08.2017</a:t>
+              <a:t>23.09.2017</a:t>
             </a:fld>
             <a:endParaRPr lang="de-DE"/>
           </a:p>
@@ -867,7 +867,7 @@
           <a:p>
             <a:fld id="{F2382EA5-9EA5-419F-BAA4-0DC6A82442DC}" type="datetimeFigureOut">
               <a:rPr lang="de-DE" smtClean="0"/>
-              <a:t>31.08.2017</a:t>
+              <a:t>23.09.2017</a:t>
             </a:fld>
             <a:endParaRPr lang="de-DE"/>
           </a:p>
@@ -1142,7 +1142,7 @@
           <a:p>
             <a:fld id="{F2382EA5-9EA5-419F-BAA4-0DC6A82442DC}" type="datetimeFigureOut">
               <a:rPr lang="de-DE" smtClean="0"/>
-              <a:t>31.08.2017</a:t>
+              <a:t>23.09.2017</a:t>
             </a:fld>
             <a:endParaRPr lang="de-DE"/>
           </a:p>
@@ -1407,7 +1407,7 @@
           <a:p>
             <a:fld id="{F2382EA5-9EA5-419F-BAA4-0DC6A82442DC}" type="datetimeFigureOut">
               <a:rPr lang="de-DE" smtClean="0"/>
-              <a:t>31.08.2017</a:t>
+              <a:t>23.09.2017</a:t>
             </a:fld>
             <a:endParaRPr lang="de-DE"/>
           </a:p>
@@ -1819,7 +1819,7 @@
           <a:p>
             <a:fld id="{F2382EA5-9EA5-419F-BAA4-0DC6A82442DC}" type="datetimeFigureOut">
               <a:rPr lang="de-DE" smtClean="0"/>
-              <a:t>31.08.2017</a:t>
+              <a:t>23.09.2017</a:t>
             </a:fld>
             <a:endParaRPr lang="de-DE"/>
           </a:p>
@@ -1960,7 +1960,7 @@
           <a:p>
             <a:fld id="{F2382EA5-9EA5-419F-BAA4-0DC6A82442DC}" type="datetimeFigureOut">
               <a:rPr lang="de-DE" smtClean="0"/>
-              <a:t>31.08.2017</a:t>
+              <a:t>23.09.2017</a:t>
             </a:fld>
             <a:endParaRPr lang="de-DE"/>
           </a:p>
@@ -2073,7 +2073,7 @@
           <a:p>
             <a:fld id="{F2382EA5-9EA5-419F-BAA4-0DC6A82442DC}" type="datetimeFigureOut">
               <a:rPr lang="de-DE" smtClean="0"/>
-              <a:t>31.08.2017</a:t>
+              <a:t>23.09.2017</a:t>
             </a:fld>
             <a:endParaRPr lang="de-DE"/>
           </a:p>
@@ -2384,7 +2384,7 @@
           <a:p>
             <a:fld id="{F2382EA5-9EA5-419F-BAA4-0DC6A82442DC}" type="datetimeFigureOut">
               <a:rPr lang="de-DE" smtClean="0"/>
-              <a:t>31.08.2017</a:t>
+              <a:t>23.09.2017</a:t>
             </a:fld>
             <a:endParaRPr lang="de-DE"/>
           </a:p>
@@ -2672,7 +2672,7 @@
           <a:p>
             <a:fld id="{F2382EA5-9EA5-419F-BAA4-0DC6A82442DC}" type="datetimeFigureOut">
               <a:rPr lang="de-DE" smtClean="0"/>
-              <a:t>31.08.2017</a:t>
+              <a:t>23.09.2017</a:t>
             </a:fld>
             <a:endParaRPr lang="de-DE"/>
           </a:p>
@@ -2913,7 +2913,7 @@
           <a:p>
             <a:fld id="{F2382EA5-9EA5-419F-BAA4-0DC6A82442DC}" type="datetimeFigureOut">
               <a:rPr lang="de-DE" smtClean="0"/>
-              <a:t>31.08.2017</a:t>
+              <a:t>23.09.2017</a:t>
             </a:fld>
             <a:endParaRPr lang="de-DE"/>
           </a:p>
@@ -5896,14 +5896,14 @@
           <p:nvPr>
             <p:extLst>
               <p:ext uri="{D42A27DB-BD31-4B8C-83A1-F6EECF244321}">
-                <p14:modId xmlns:p14="http://schemas.microsoft.com/office/powerpoint/2010/main" val="2587622977"/>
+                <p14:modId xmlns:p14="http://schemas.microsoft.com/office/powerpoint/2010/main" val="3880665943"/>
               </p:ext>
             </p:extLst>
           </p:nvPr>
         </p:nvGraphicFramePr>
         <p:xfrm>
           <a:off x="8319496" y="3185160"/>
-          <a:ext cx="1012014" cy="1543213"/>
+          <a:ext cx="1164864" cy="1543213"/>
         </p:xfrm>
         <a:graphic>
           <a:graphicData uri="http://schemas.openxmlformats.org/drawingml/2006/table">
@@ -5912,14 +5912,14 @@
                 <a:tableStyleId>{5C22544A-7EE6-4342-B048-85BDC9FD1C3A}</a:tableStyleId>
               </a:tblPr>
               <a:tblGrid>
-                <a:gridCol w="506007">
+                <a:gridCol w="582432">
                   <a:extLst>
                     <a:ext uri="{9D8B030D-6E8A-4147-A177-3AD203B41FA5}">
                       <a16:colId xmlns:a16="http://schemas.microsoft.com/office/drawing/2014/main" val="772889815"/>
                     </a:ext>
                   </a:extLst>
                 </a:gridCol>
-                <a:gridCol w="506007">
+                <a:gridCol w="582432">
                   <a:extLst>
                     <a:ext uri="{9D8B030D-6E8A-4147-A177-3AD203B41FA5}">
                       <a16:colId xmlns:a16="http://schemas.microsoft.com/office/drawing/2014/main" val="2247143488"/>
@@ -5936,7 +5936,7 @@
                       <a:pPr algn="ctr"/>
                       <a:r>
                         <a:rPr lang="de-DE" sz="500" dirty="0"/>
-                        <a:t>Free</a:t>
+                        <a:t>Motor Einschenken B</a:t>
                       </a:r>
                     </a:p>
                   </a:txBody>
@@ -6032,7 +6032,7 @@
                       <a:pPr algn="ctr"/>
                       <a:r>
                         <a:rPr lang="de-DE" sz="500" dirty="0"/>
-                        <a:t>Free</a:t>
+                        <a:t>Motor Baum A</a:t>
                       </a:r>
                     </a:p>
                   </a:txBody>
@@ -6064,7 +6064,7 @@
                       <a:pPr algn="ctr"/>
                       <a:r>
                         <a:rPr lang="de-DE" sz="500" dirty="0"/>
-                        <a:t>Free</a:t>
+                        <a:t>Motor Baum B</a:t>
                       </a:r>
                     </a:p>
                   </a:txBody>
@@ -6096,7 +6096,7 @@
                       <a:pPr algn="ctr"/>
                       <a:r>
                         <a:rPr lang="de-DE" sz="500" dirty="0"/>
-                        <a:t>Free</a:t>
+                        <a:t>Motor Pumpe A</a:t>
                       </a:r>
                     </a:p>
                   </a:txBody>
@@ -6128,7 +6128,7 @@
                       <a:pPr algn="ctr"/>
                       <a:r>
                         <a:rPr lang="de-DE" sz="500" dirty="0"/>
-                        <a:t>Free</a:t>
+                        <a:t>Motor Pumpe B</a:t>
                       </a:r>
                     </a:p>
                   </a:txBody>
@@ -6160,7 +6160,7 @@
                       <a:pPr algn="ctr"/>
                       <a:r>
                         <a:rPr lang="de-DE" sz="500" dirty="0"/>
-                        <a:t>Free</a:t>
+                        <a:t>Motor Transport A</a:t>
                       </a:r>
                     </a:p>
                   </a:txBody>
@@ -6192,7 +6192,7 @@
                       <a:pPr algn="ctr"/>
                       <a:r>
                         <a:rPr lang="de-DE" sz="500" dirty="0"/>
-                        <a:t>Free</a:t>
+                        <a:t>Motor Transport B</a:t>
                       </a:r>
                     </a:p>
                   </a:txBody>
@@ -6302,6 +6302,35 @@
                     <a:lstStyle/>
                     <a:p>
                       <a:pPr algn="ctr"/>
+                      <a:endParaRPr lang="de-DE" sz="500" dirty="0"/>
+                    </a:p>
+                  </a:txBody>
+                  <a:tcPr marL="0" marR="0" marT="0" marB="0"/>
+                </a:tc>
+                <a:tc>
+                  <a:txBody>
+                    <a:bodyPr/>
+                    <a:lstStyle/>
+                    <a:p>
+                      <a:pPr algn="ctr"/>
+                      <a:endParaRPr lang="de-DE" sz="500" dirty="0"/>
+                    </a:p>
+                  </a:txBody>
+                  <a:tcPr marL="0" marR="0" marT="0" marB="0"/>
+                </a:tc>
+                <a:extLst>
+                  <a:ext uri="{0D108BD9-81ED-4DB2-BD59-A6C34878D82A}">
+                    <a16:rowId xmlns:a16="http://schemas.microsoft.com/office/drawing/2014/main" val="798089714"/>
+                  </a:ext>
+                </a:extLst>
+              </a:tr>
+              <a:tr h="91281">
+                <a:tc>
+                  <a:txBody>
+                    <a:bodyPr/>
+                    <a:lstStyle/>
+                    <a:p>
+                      <a:pPr algn="ctr"/>
                       <a:r>
                         <a:rPr lang="de-DE" sz="500" dirty="0"/>
                         <a:t>Free</a:t>
@@ -6323,7 +6352,7 @@
                 </a:tc>
                 <a:extLst>
                   <a:ext uri="{0D108BD9-81ED-4DB2-BD59-A6C34878D82A}">
-                    <a16:rowId xmlns:a16="http://schemas.microsoft.com/office/drawing/2014/main" val="798089714"/>
+                    <a16:rowId xmlns:a16="http://schemas.microsoft.com/office/drawing/2014/main" val="1918283735"/>
                   </a:ext>
                 </a:extLst>
               </a:tr>
@@ -6336,7 +6365,7 @@
                       <a:pPr algn="ctr"/>
                       <a:r>
                         <a:rPr lang="de-DE" sz="500" dirty="0"/>
-                        <a:t>Free</a:t>
+                        <a:t>Motor Plattform A</a:t>
                       </a:r>
                     </a:p>
                   </a:txBody>
@@ -6355,7 +6384,7 @@
                 </a:tc>
                 <a:extLst>
                   <a:ext uri="{0D108BD9-81ED-4DB2-BD59-A6C34878D82A}">
-                    <a16:rowId xmlns:a16="http://schemas.microsoft.com/office/drawing/2014/main" val="1918283735"/>
+                    <a16:rowId xmlns:a16="http://schemas.microsoft.com/office/drawing/2014/main" val="1864289848"/>
                   </a:ext>
                 </a:extLst>
               </a:tr>
@@ -6368,39 +6397,7 @@
                       <a:pPr algn="ctr"/>
                       <a:r>
                         <a:rPr lang="de-DE" sz="500" dirty="0"/>
-                        <a:t>Free</a:t>
-                      </a:r>
-                    </a:p>
-                  </a:txBody>
-                  <a:tcPr marL="0" marR="0" marT="0" marB="0"/>
-                </a:tc>
-                <a:tc>
-                  <a:txBody>
-                    <a:bodyPr/>
-                    <a:lstStyle/>
-                    <a:p>
-                      <a:pPr algn="ctr"/>
-                      <a:endParaRPr lang="de-DE" sz="500" dirty="0"/>
-                    </a:p>
-                  </a:txBody>
-                  <a:tcPr marL="0" marR="0" marT="0" marB="0"/>
-                </a:tc>
-                <a:extLst>
-                  <a:ext uri="{0D108BD9-81ED-4DB2-BD59-A6C34878D82A}">
-                    <a16:rowId xmlns:a16="http://schemas.microsoft.com/office/drawing/2014/main" val="1864289848"/>
-                  </a:ext>
-                </a:extLst>
-              </a:tr>
-              <a:tr h="91281">
-                <a:tc>
-                  <a:txBody>
-                    <a:bodyPr/>
-                    <a:lstStyle/>
-                    <a:p>
-                      <a:pPr algn="ctr"/>
-                      <a:r>
-                        <a:rPr lang="de-DE" sz="500" dirty="0"/>
-                        <a:t>Free</a:t>
+                        <a:t>Motor Plattform B</a:t>
                       </a:r>
                     </a:p>
                   </a:txBody>
@@ -6509,7 +6506,7 @@
           <p:nvPr>
             <p:extLst>
               <p:ext uri="{D42A27DB-BD31-4B8C-83A1-F6EECF244321}">
-                <p14:modId xmlns:p14="http://schemas.microsoft.com/office/powerpoint/2010/main" val="3799825524"/>
+                <p14:modId xmlns:p14="http://schemas.microsoft.com/office/powerpoint/2010/main" val="1768849033"/>
               </p:ext>
             </p:extLst>
           </p:nvPr>
@@ -6781,7 +6778,7 @@
                       <a:pPr algn="ctr"/>
                       <a:r>
                         <a:rPr lang="de-DE" sz="500" dirty="0"/>
-                        <a:t>Free</a:t>
+                        <a:t>Motor Wahl Pumpe A</a:t>
                       </a:r>
                     </a:p>
                   </a:txBody>
@@ -6813,7 +6810,7 @@
                       <a:pPr algn="ctr"/>
                       <a:r>
                         <a:rPr lang="de-DE" sz="500" dirty="0"/>
-                        <a:t>Free</a:t>
+                        <a:t>Motor Wahl Pumpe B</a:t>
                       </a:r>
                     </a:p>
                   </a:txBody>
@@ -6845,7 +6842,7 @@
                       <a:pPr algn="ctr"/>
                       <a:r>
                         <a:rPr lang="de-DE" sz="500" dirty="0"/>
-                        <a:t>Free</a:t>
+                        <a:t>Motor Einschenken A</a:t>
                       </a:r>
                     </a:p>
                   </a:txBody>

</xml_diff>